<commit_message>
Added slimfly network background slide info
</commit_message>
<xml_diff>
--- a/writeups/vispres.pptx
+++ b/writeups/vispres.pptx
@@ -111,7 +111,7 @@
   </p:defaultTextStyle>
   <p:extLst>
     <p:ext uri="{EFAFB233-063F-42B5-8137-9DF3F51BA10A}">
-      <p15:sldGuideLst xmlns:p15="http://schemas.microsoft.com/office/powerpoint/2012/main"/>
+      <p15:sldGuideLst xmlns:p15="http://schemas.microsoft.com/office/powerpoint/2012/main" xmlns=""/>
     </p:ext>
   </p:extLst>
 </p:presentation>
@@ -737,7 +737,7 @@
         </p:nvSpPr>
         <p:spPr>
           <a:xfrm>
-            <a:off x="1507067" y="4050833"/>
+            <a:off x="1507067" y="4050837"/>
             <a:ext cx="7766936" cy="1096899"/>
           </a:xfrm>
         </p:spPr>
@@ -863,7 +863,7 @@
             <a:fld id="{B61BEF0D-F0BB-DE4B-95CE-6DB70DBA9567}" type="datetimeFigureOut">
               <a:rPr lang="en-US" dirty="0"/>
               <a:pPr/>
-              <a:t>5/2/2016</a:t>
+              <a:t>5/3/16</a:t>
             </a:fld>
             <a:endParaRPr lang="en-US" dirty="0"/>
           </a:p>
@@ -1111,7 +1111,7 @@
             <a:fld id="{B61BEF0D-F0BB-DE4B-95CE-6DB70DBA9567}" type="datetimeFigureOut">
               <a:rPr lang="en-US" dirty="0"/>
               <a:pPr/>
-              <a:t>5/2/2016</a:t>
+              <a:t>5/3/16</a:t>
             </a:fld>
             <a:endParaRPr lang="en-US" dirty="0"/>
           </a:p>
@@ -1197,8 +1197,8 @@
         </p:nvSpPr>
         <p:spPr>
           <a:xfrm>
-            <a:off x="931334" y="609600"/>
-            <a:ext cx="8094134" cy="3022600"/>
+            <a:off x="931335" y="609600"/>
+            <a:ext cx="8094135" cy="3022600"/>
           </a:xfrm>
         </p:spPr>
         <p:txBody>
@@ -1422,7 +1422,7 @@
             <a:fld id="{B61BEF0D-F0BB-DE4B-95CE-6DB70DBA9567}" type="datetimeFigureOut">
               <a:rPr lang="en-US" dirty="0"/>
               <a:pPr/>
-              <a:t>5/2/2016</a:t>
+              <a:t>5/3/16</a:t>
             </a:fld>
             <a:endParaRPr lang="en-US" dirty="0"/>
           </a:p>
@@ -1479,7 +1479,7 @@
         </p:nvSpPr>
         <p:spPr>
           <a:xfrm>
-            <a:off x="541870" y="790378"/>
+            <a:off x="541871" y="790378"/>
             <a:ext cx="609600" cy="584776"/>
           </a:xfrm>
           <a:prstGeom prst="rect">
@@ -1752,7 +1752,7 @@
             <a:fld id="{B61BEF0D-F0BB-DE4B-95CE-6DB70DBA9567}" type="datetimeFigureOut">
               <a:rPr lang="en-US" dirty="0"/>
               <a:pPr/>
-              <a:t>5/2/2016</a:t>
+              <a:t>5/3/16</a:t>
             </a:fld>
             <a:endParaRPr lang="en-US" dirty="0"/>
           </a:p>
@@ -1838,8 +1838,8 @@
         </p:nvSpPr>
         <p:spPr>
           <a:xfrm>
-            <a:off x="931334" y="609600"/>
-            <a:ext cx="8094134" cy="3022600"/>
+            <a:off x="931335" y="609600"/>
+            <a:ext cx="8094135" cy="3022600"/>
           </a:xfrm>
         </p:spPr>
         <p:txBody>
@@ -2063,7 +2063,7 @@
             <a:fld id="{B61BEF0D-F0BB-DE4B-95CE-6DB70DBA9567}" type="datetimeFigureOut">
               <a:rPr lang="en-US" dirty="0"/>
               <a:pPr/>
-              <a:t>5/2/2016</a:t>
+              <a:t>5/3/16</a:t>
             </a:fld>
             <a:endParaRPr lang="en-US" dirty="0"/>
           </a:p>
@@ -2120,7 +2120,7 @@
         </p:nvSpPr>
         <p:spPr>
           <a:xfrm>
-            <a:off x="541870" y="790378"/>
+            <a:off x="541871" y="790378"/>
             <a:ext cx="609600" cy="584776"/>
           </a:xfrm>
           <a:prstGeom prst="rect">
@@ -2231,7 +2231,7 @@
         </p:nvSpPr>
         <p:spPr>
           <a:xfrm>
-            <a:off x="685799" y="609600"/>
+            <a:off x="685801" y="609600"/>
             <a:ext cx="8588203" cy="3022600"/>
           </a:xfrm>
         </p:spPr>
@@ -2453,7 +2453,7 @@
             <a:fld id="{B61BEF0D-F0BB-DE4B-95CE-6DB70DBA9567}" type="datetimeFigureOut">
               <a:rPr lang="en-US" dirty="0"/>
               <a:pPr/>
-              <a:t>5/2/2016</a:t>
+              <a:t>5/3/16</a:t>
             </a:fld>
             <a:endParaRPr lang="en-US" dirty="0"/>
           </a:p>
@@ -2619,7 +2619,7 @@
           <a:p>
             <a:fld id="{55C6B4A9-1611-4792-9094-5F34BCA07E0B}" type="datetimeFigureOut">
               <a:rPr lang="en-US" dirty="0"/>
-              <a:t>5/2/2016</a:t>
+              <a:t>5/3/16</a:t>
             </a:fld>
             <a:endParaRPr lang="en-US" dirty="0"/>
           </a:p>
@@ -2704,7 +2704,7 @@
         </p:nvSpPr>
         <p:spPr>
           <a:xfrm>
-            <a:off x="7967673" y="609599"/>
+            <a:off x="7967675" y="609603"/>
             <a:ext cx="1304743" cy="5251451"/>
           </a:xfrm>
         </p:spPr>
@@ -2732,8 +2732,8 @@
         </p:nvSpPr>
         <p:spPr>
           <a:xfrm>
-            <a:off x="677335" y="609600"/>
-            <a:ext cx="7060150" cy="5251450"/>
+            <a:off x="677337" y="609600"/>
+            <a:ext cx="7060151" cy="5251450"/>
           </a:xfrm>
         </p:spPr>
         <p:txBody>
@@ -2795,7 +2795,7 @@
             <a:fld id="{B61BEF0D-F0BB-DE4B-95CE-6DB70DBA9567}" type="datetimeFigureOut">
               <a:rPr lang="en-US" dirty="0"/>
               <a:pPr/>
-              <a:t>5/2/2016</a:t>
+              <a:t>5/3/16</a:t>
             </a:fld>
             <a:endParaRPr lang="en-US" dirty="0"/>
           </a:p>
@@ -2961,7 +2961,7 @@
           <a:p>
             <a:fld id="{42A54C80-263E-416B-A8E0-580EDEADCBDC}" type="datetimeFigureOut">
               <a:rPr lang="en-US" dirty="0"/>
-              <a:t>5/2/2016</a:t>
+              <a:t>5/3/16</a:t>
             </a:fld>
             <a:endParaRPr lang="en-US" dirty="0"/>
           </a:p>
@@ -3046,7 +3046,7 @@
         </p:nvSpPr>
         <p:spPr>
           <a:xfrm>
-            <a:off x="677335" y="2700867"/>
+            <a:off x="677335" y="2700871"/>
             <a:ext cx="8596668" cy="1826581"/>
           </a:xfrm>
         </p:spPr>
@@ -3204,7 +3204,7 @@
             <a:fld id="{B61BEF0D-F0BB-DE4B-95CE-6DB70DBA9567}" type="datetimeFigureOut">
               <a:rPr lang="en-US" dirty="0"/>
               <a:pPr/>
-              <a:t>5/2/2016</a:t>
+              <a:t>5/3/16</a:t>
             </a:fld>
             <a:endParaRPr lang="en-US" dirty="0"/>
           </a:p>
@@ -3313,7 +3313,7 @@
         </p:nvSpPr>
         <p:spPr>
           <a:xfrm>
-            <a:off x="677334" y="2160589"/>
+            <a:off x="677336" y="2160589"/>
             <a:ext cx="4184035" cy="3880772"/>
           </a:xfrm>
         </p:spPr>
@@ -3370,8 +3370,8 @@
         </p:nvSpPr>
         <p:spPr>
           <a:xfrm>
-            <a:off x="5089970" y="2160589"/>
-            <a:ext cx="4184034" cy="3880773"/>
+            <a:off x="5089969" y="2160590"/>
+            <a:ext cx="4184035" cy="3880773"/>
           </a:xfrm>
         </p:spPr>
         <p:txBody>
@@ -3432,7 +3432,7 @@
           <a:p>
             <a:fld id="{42A54C80-263E-416B-A8E0-580EDEADCBDC}" type="datetimeFigureOut">
               <a:rPr lang="en-US" dirty="0"/>
-              <a:t>5/2/2016</a:t>
+              <a:t>5/3/16</a:t>
             </a:fld>
             <a:endParaRPr lang="en-US" dirty="0"/>
           </a:p>
@@ -3544,7 +3544,7 @@
         </p:nvSpPr>
         <p:spPr>
           <a:xfrm>
-            <a:off x="675745" y="2160983"/>
+            <a:off x="675747" y="2160983"/>
             <a:ext cx="4185623" cy="576262"/>
           </a:xfrm>
         </p:spPr>
@@ -3611,7 +3611,7 @@
         </p:nvSpPr>
         <p:spPr>
           <a:xfrm>
-            <a:off x="675745" y="2737245"/>
+            <a:off x="675747" y="2737249"/>
             <a:ext cx="4185623" cy="3304117"/>
           </a:xfrm>
         </p:spPr>
@@ -3670,8 +3670,8 @@
         </p:nvSpPr>
         <p:spPr>
           <a:xfrm>
-            <a:off x="5088383" y="2160983"/>
-            <a:ext cx="4185618" cy="576262"/>
+            <a:off x="5088384" y="2160983"/>
+            <a:ext cx="4185619" cy="576262"/>
           </a:xfrm>
         </p:spPr>
         <p:txBody>
@@ -3737,7 +3737,7 @@
         </p:nvSpPr>
         <p:spPr>
           <a:xfrm>
-            <a:off x="5088384" y="2737245"/>
+            <a:off x="5088386" y="2737249"/>
             <a:ext cx="4185617" cy="3304117"/>
           </a:xfrm>
         </p:spPr>
@@ -3802,7 +3802,7 @@
             <a:fld id="{B61BEF0D-F0BB-DE4B-95CE-6DB70DBA9567}" type="datetimeFigureOut">
               <a:rPr lang="en-US" dirty="0"/>
               <a:pPr/>
-              <a:t>5/2/2016</a:t>
+              <a:t>5/3/16</a:t>
             </a:fld>
             <a:endParaRPr lang="en-US" dirty="0"/>
           </a:p>
@@ -3888,7 +3888,7 @@
         </p:nvSpPr>
         <p:spPr>
           <a:xfrm>
-            <a:off x="677334" y="609600"/>
+            <a:off x="677335" y="609600"/>
             <a:ext cx="8596668" cy="1320800"/>
           </a:xfrm>
         </p:spPr>
@@ -3922,7 +3922,7 @@
             <a:fld id="{B61BEF0D-F0BB-DE4B-95CE-6DB70DBA9567}" type="datetimeFigureOut">
               <a:rPr lang="en-US" dirty="0"/>
               <a:pPr/>
-              <a:t>5/2/2016</a:t>
+              <a:t>5/3/16</a:t>
             </a:fld>
             <a:endParaRPr lang="en-US" dirty="0"/>
           </a:p>
@@ -4014,7 +4014,7 @@
             <a:fld id="{B61BEF0D-F0BB-DE4B-95CE-6DB70DBA9567}" type="datetimeFigureOut">
               <a:rPr lang="en-US" dirty="0"/>
               <a:pPr/>
-              <a:t>5/2/2016</a:t>
+              <a:t>5/3/16</a:t>
             </a:fld>
             <a:endParaRPr lang="en-US" dirty="0"/>
           </a:p>
@@ -4100,7 +4100,7 @@
         </p:nvSpPr>
         <p:spPr>
           <a:xfrm>
-            <a:off x="677334" y="1498604"/>
+            <a:off x="677335" y="1498604"/>
             <a:ext cx="3854528" cy="1278466"/>
           </a:xfrm>
         </p:spPr>
@@ -4134,7 +4134,7 @@
         </p:nvSpPr>
         <p:spPr>
           <a:xfrm>
-            <a:off x="4760461" y="514924"/>
+            <a:off x="4760463" y="514928"/>
             <a:ext cx="4513541" cy="5526437"/>
           </a:xfrm>
         </p:spPr>
@@ -4193,7 +4193,7 @@
         </p:nvSpPr>
         <p:spPr>
           <a:xfrm>
-            <a:off x="677334" y="2777069"/>
+            <a:off x="677335" y="2777069"/>
             <a:ext cx="3854528" cy="2584449"/>
           </a:xfrm>
         </p:spPr>
@@ -4265,7 +4265,7 @@
           <a:p>
             <a:fld id="{42A54C80-263E-416B-A8E0-580EDEADCBDC}" type="datetimeFigureOut">
               <a:rPr lang="en-US" dirty="0"/>
-              <a:t>5/2/2016</a:t>
+              <a:t>5/3/16</a:t>
             </a:fld>
             <a:endParaRPr lang="en-US" dirty="0"/>
           </a:p>
@@ -4350,7 +4350,7 @@
         </p:nvSpPr>
         <p:spPr>
           <a:xfrm>
-            <a:off x="677334" y="4800600"/>
+            <a:off x="677336" y="4800600"/>
             <a:ext cx="8596667" cy="566738"/>
           </a:xfrm>
         </p:spPr>
@@ -4384,7 +4384,7 @@
         </p:nvSpPr>
         <p:spPr>
           <a:xfrm>
-            <a:off x="677334" y="609600"/>
+            <a:off x="677335" y="609600"/>
             <a:ext cx="8596668" cy="3845718"/>
           </a:xfrm>
         </p:spPr>
@@ -4451,7 +4451,7 @@
         </p:nvSpPr>
         <p:spPr>
           <a:xfrm>
-            <a:off x="677334" y="5367338"/>
+            <a:off x="677336" y="5367338"/>
             <a:ext cx="8596667" cy="674024"/>
           </a:xfrm>
         </p:spPr>
@@ -4567,7 +4567,7 @@
             <a:fld id="{B61BEF0D-F0BB-DE4B-95CE-6DB70DBA9567}" type="datetimeFigureOut">
               <a:rPr lang="en-US" dirty="0"/>
               <a:pPr/>
-              <a:t>5/2/2016</a:t>
+              <a:t>5/3/16</a:t>
             </a:fld>
             <a:endParaRPr lang="en-US" dirty="0"/>
           </a:p>
@@ -5146,7 +5146,7 @@
         </p:nvSpPr>
         <p:spPr>
           <a:xfrm>
-            <a:off x="677334" y="609600"/>
+            <a:off x="677335" y="609600"/>
             <a:ext cx="8596668" cy="1320800"/>
           </a:xfrm>
           <a:prstGeom prst="rect">
@@ -5179,7 +5179,7 @@
         </p:nvSpPr>
         <p:spPr>
           <a:xfrm>
-            <a:off x="677334" y="2160589"/>
+            <a:off x="677335" y="2160590"/>
             <a:ext cx="8596668" cy="3880773"/>
           </a:xfrm>
           <a:prstGeom prst="rect">
@@ -5241,7 +5241,7 @@
         </p:nvSpPr>
         <p:spPr>
           <a:xfrm>
-            <a:off x="7205133" y="6041362"/>
+            <a:off x="7205133" y="6041366"/>
             <a:ext cx="911939" cy="365125"/>
           </a:xfrm>
           <a:prstGeom prst="rect">
@@ -5265,7 +5265,7 @@
             <a:fld id="{B61BEF0D-F0BB-DE4B-95CE-6DB70DBA9567}" type="datetimeFigureOut">
               <a:rPr lang="en-US" dirty="0"/>
               <a:pPr/>
-              <a:t>5/2/2016</a:t>
+              <a:t>5/3/16</a:t>
             </a:fld>
             <a:endParaRPr lang="en-US" dirty="0"/>
           </a:p>
@@ -5283,7 +5283,7 @@
         </p:nvSpPr>
         <p:spPr>
           <a:xfrm>
-            <a:off x="677334" y="6041362"/>
+            <a:off x="677335" y="6041366"/>
             <a:ext cx="6297612" cy="365125"/>
           </a:xfrm>
           <a:prstGeom prst="rect">
@@ -5320,7 +5320,7 @@
         </p:nvSpPr>
         <p:spPr>
           <a:xfrm>
-            <a:off x="8590663" y="6041362"/>
+            <a:off x="8590665" y="6041366"/>
             <a:ext cx="683339" cy="365125"/>
           </a:xfrm>
           <a:prstGeom prst="rect">
@@ -5896,7 +5896,7 @@
         </p:nvSpPr>
         <p:spPr>
           <a:xfrm>
-            <a:off x="677334" y="1270000"/>
+            <a:off x="677335" y="1270004"/>
             <a:ext cx="8596668" cy="5377935"/>
           </a:xfrm>
         </p:spPr>
@@ -5914,7 +5914,15 @@
           <a:p>
             <a:r>
               <a:rPr lang="en-US" dirty="0" smtClean="0"/>
-              <a:t>Simulation entities are called logical processes (or LPs) which are mapped to the processing elements (or Pes) being used in the simulation</a:t>
+              <a:t>Simulation entities are called logical processes (or LPs) which are mapped to the processing elements (or </a:t>
+            </a:r>
+            <a:r>
+              <a:rPr lang="en-US" dirty="0" smtClean="0"/>
+              <a:t>PEs</a:t>
+            </a:r>
+            <a:r>
+              <a:rPr lang="en-US" dirty="0" smtClean="0"/>
+              <a:t>) being used in the simulation</a:t>
             </a:r>
           </a:p>
           <a:p>
@@ -6050,15 +6058,126 @@
             <p:ph idx="1"/>
           </p:nvPr>
         </p:nvSpPr>
-        <p:spPr/>
-        <p:txBody>
-          <a:bodyPr/>
-          <a:lstStyle/>
-          <a:p>
+        <p:spPr>
+          <a:xfrm>
+            <a:off x="5623661" y="1813011"/>
+            <a:ext cx="3694139" cy="3880773"/>
+          </a:xfrm>
+        </p:spPr>
+        <p:txBody>
+          <a:bodyPr>
+            <a:normAutofit/>
+          </a:bodyPr>
+          <a:lstStyle/>
+          <a:p>
+            <a:r>
+              <a:rPr lang="en-US" dirty="0" smtClean="0"/>
+              <a:t>What is it?</a:t>
+            </a:r>
+          </a:p>
+          <a:p>
+            <a:pPr lvl="1"/>
+            <a:r>
+              <a:rPr lang="en-US" dirty="0" smtClean="0"/>
+              <a:t>Cost-effective structured </a:t>
+            </a:r>
+            <a:r>
+              <a:rPr lang="en-US" dirty="0"/>
+              <a:t>layout for connecting compute nodes in large scale supercomputing </a:t>
+            </a:r>
+            <a:r>
+              <a:rPr lang="en-US" dirty="0" smtClean="0"/>
+              <a:t>systems</a:t>
+            </a:r>
+            <a:endParaRPr lang="en-US" dirty="0"/>
+          </a:p>
+          <a:p>
+            <a:r>
+              <a:rPr lang="en-US" dirty="0"/>
+              <a:t>Max </a:t>
+            </a:r>
+            <a:r>
+              <a:rPr lang="en-US" dirty="0" smtClean="0"/>
+              <a:t>network diameter</a:t>
+            </a:r>
+            <a:r>
+              <a:rPr lang="en-US" dirty="0"/>
+              <a:t>: </a:t>
+            </a:r>
+            <a:r>
+              <a:rPr lang="en-US" dirty="0" smtClean="0"/>
+              <a:t>2</a:t>
+            </a:r>
             <a:endParaRPr lang="en-US" dirty="0" smtClean="0"/>
           </a:p>
-        </p:txBody>
-      </p:sp>
+          <a:p>
+            <a:r>
+              <a:rPr lang="en-US" dirty="0" smtClean="0"/>
+              <a:t>Logical Processes (LPs)</a:t>
+            </a:r>
+          </a:p>
+          <a:p>
+            <a:pPr lvl="1"/>
+            <a:r>
+              <a:rPr lang="en-US" b="1" dirty="0" smtClean="0"/>
+              <a:t>Terminals</a:t>
+            </a:r>
+            <a:r>
+              <a:rPr lang="en-US" dirty="0" smtClean="0"/>
+              <a:t>/compute nodes</a:t>
+            </a:r>
+          </a:p>
+          <a:p>
+            <a:pPr lvl="1"/>
+            <a:r>
+              <a:rPr lang="en-US" b="1" dirty="0" smtClean="0"/>
+              <a:t>Routers</a:t>
+            </a:r>
+            <a:r>
+              <a:rPr lang="en-US" dirty="0" smtClean="0"/>
+              <a:t>/Switches</a:t>
+            </a:r>
+          </a:p>
+          <a:p>
+            <a:r>
+              <a:rPr lang="en-US" dirty="0" smtClean="0"/>
+              <a:t>Processing Elements (PEs)</a:t>
+            </a:r>
+          </a:p>
+          <a:p>
+            <a:pPr lvl="1"/>
+            <a:r>
+              <a:rPr lang="en-US" dirty="0" smtClean="0"/>
+              <a:t>MPI processes </a:t>
+            </a:r>
+            <a:endParaRPr lang="en-US" dirty="0" smtClean="0"/>
+          </a:p>
+        </p:txBody>
+      </p:sp>
+      <p:pic>
+        <p:nvPicPr>
+          <p:cNvPr id="5" name="Picture 4"/>
+          <p:cNvPicPr>
+            <a:picLocks noChangeAspect="1"/>
+          </p:cNvPicPr>
+          <p:nvPr/>
+        </p:nvPicPr>
+        <p:blipFill>
+          <a:blip r:embed="rId2"/>
+          <a:stretch>
+            <a:fillRect/>
+          </a:stretch>
+        </p:blipFill>
+        <p:spPr>
+          <a:xfrm>
+            <a:off x="1699795" y="1532726"/>
+            <a:ext cx="2685048" cy="5084642"/>
+          </a:xfrm>
+          <a:prstGeom prst="rect">
+            <a:avLst/>
+          </a:prstGeom>
+        </p:spPr>
+      </p:pic>
     </p:spTree>
     <p:extLst>
       <p:ext uri="{BB962C8B-B14F-4D97-AF65-F5344CB8AC3E}">
@@ -6430,7 +6549,7 @@
     </a:clrScheme>
     <a:fontScheme name="Facet">
       <a:majorFont>
-        <a:latin typeface="Trebuchet MS" panose="020B0603020202020204"/>
+        <a:latin typeface="Trebuchet MS"/>
         <a:ea typeface=""/>
         <a:cs typeface=""/>
         <a:font script="Jpan" typeface="メイリオ"/>
@@ -6465,7 +6584,7 @@
         <a:font script="Geor" typeface="Sylfaen"/>
       </a:majorFont>
       <a:minorFont>
-        <a:latin typeface="Trebuchet MS" panose="020B0603020202020204"/>
+        <a:latin typeface="Trebuchet MS"/>
         <a:ea typeface=""/>
         <a:cs typeface=""/>
         <a:font script="Jpan" typeface="メイリオ"/>
@@ -6638,7 +6757,7 @@
   <a:extraClrSchemeLst/>
   <a:extLst>
     <a:ext uri="{05A4C25C-085E-4340-85A3-A5531E510DB2}">
-      <thm15:themeFamily xmlns:thm15="http://schemas.microsoft.com/office/thememl/2012/main" name="Facet" id="{C0C680CD-088A-49FC-A102-D699147F32B2}" vid="{0B5AB586-D108-4FC1-8368-649FE654B894}"/>
+      <thm15:themeFamily xmlns:thm15="http://schemas.microsoft.com/office/thememl/2012/main" xmlns="" name="Facet" id="{C0C680CD-088A-49FC-A102-D699147F32B2}" vid="{0B5AB586-D108-4FC1-8368-649FE654B894}"/>
     </a:ext>
   </a:extLst>
 </a:theme>

</xml_diff>

<commit_message>
Added slide to show simulation process
</commit_message>
<xml_diff>
--- a/writeups/vispres.pptx
+++ b/writeups/vispres.pptx
@@ -8,9 +8,10 @@
     <p:sldId id="256" r:id="rId2"/>
     <p:sldId id="257" r:id="rId3"/>
     <p:sldId id="261" r:id="rId4"/>
-    <p:sldId id="259" r:id="rId5"/>
-    <p:sldId id="260" r:id="rId6"/>
-    <p:sldId id="258" r:id="rId7"/>
+    <p:sldId id="262" r:id="rId5"/>
+    <p:sldId id="259" r:id="rId6"/>
+    <p:sldId id="260" r:id="rId7"/>
+    <p:sldId id="258" r:id="rId8"/>
   </p:sldIdLst>
   <p:sldSz cx="12192000" cy="6858000"/>
   <p:notesSz cx="6858000" cy="9144000"/>
@@ -6225,95 +6226,44 @@
           <a:p>
             <a:r>
               <a:rPr lang="en-US" dirty="0" smtClean="0"/>
-              <a:t>Motivation and Audience</a:t>
-            </a:r>
-            <a:endParaRPr lang="en-US" dirty="0"/>
-          </a:p>
-        </p:txBody>
-      </p:sp>
-      <p:sp>
-        <p:nvSpPr>
-          <p:cNvPr id="3" name="Content Placeholder 2"/>
-          <p:cNvSpPr>
-            <a:spLocks noGrp="1"/>
-          </p:cNvSpPr>
-          <p:nvPr>
-            <p:ph idx="1"/>
-          </p:nvPr>
-        </p:nvSpPr>
-        <p:spPr/>
-        <p:txBody>
-          <a:bodyPr/>
-          <a:lstStyle/>
-          <a:p>
+              <a:t>Background – Slim Fly </a:t>
+            </a:r>
             <a:r>
               <a:rPr lang="en-US" dirty="0" smtClean="0"/>
-              <a:t>Learning how to effectively visualize simulation performance data on a smaller scale model</a:t>
-            </a:r>
-          </a:p>
-          <a:p>
-            <a:r>
-              <a:rPr lang="en-US" dirty="0" smtClean="0"/>
-              <a:t>PDES developers, particularly those using ROSS and other optimistic simulators</a:t>
-            </a:r>
-          </a:p>
-          <a:p>
-            <a:r>
-              <a:rPr lang="en-US" dirty="0" smtClean="0"/>
-              <a:t>Questions we aimed to answer with this visualization:</a:t>
-            </a:r>
-          </a:p>
-          <a:p>
-            <a:pPr lvl="1"/>
-            <a:r>
-              <a:rPr lang="en-US" dirty="0" smtClean="0"/>
-              <a:t>How can we boost the performance of the visualization?</a:t>
-            </a:r>
-          </a:p>
-          <a:p>
-            <a:pPr lvl="2"/>
-            <a:r>
-              <a:rPr lang="en-US" dirty="0" smtClean="0"/>
-              <a:t>Optimizing batch and </a:t>
-            </a:r>
-            <a:r>
-              <a:rPr lang="en-US" dirty="0" err="1" smtClean="0"/>
-              <a:t>gvt</a:t>
-            </a:r>
-            <a:r>
-              <a:rPr lang="en-US" dirty="0" smtClean="0"/>
-              <a:t>-interval parameters</a:t>
-            </a:r>
-          </a:p>
-          <a:p>
-            <a:pPr lvl="1"/>
-            <a:r>
-              <a:rPr lang="en-US" dirty="0" smtClean="0"/>
-              <a:t>How does the performance of the slim fly and dragonfly models differ?</a:t>
-            </a:r>
-          </a:p>
-          <a:p>
-            <a:pPr lvl="2"/>
-            <a:r>
-              <a:rPr lang="en-US" dirty="0" smtClean="0"/>
-              <a:t>Only had time to focus on the slim fly model</a:t>
-            </a:r>
-          </a:p>
-          <a:p>
-            <a:pPr marL="457200" lvl="1" indent="0">
-              <a:buNone/>
-            </a:pPr>
-            <a:endParaRPr lang="en-US" dirty="0" smtClean="0"/>
-          </a:p>
-          <a:p>
-            <a:endParaRPr lang="en-US" dirty="0"/>
-          </a:p>
-        </p:txBody>
-      </p:sp>
+              <a:t>simulation</a:t>
+            </a:r>
+            <a:endParaRPr lang="en-US" dirty="0"/>
+          </a:p>
+        </p:txBody>
+      </p:sp>
+      <p:pic>
+        <p:nvPicPr>
+          <p:cNvPr id="6" name="Picture 5"/>
+          <p:cNvPicPr>
+            <a:picLocks noChangeAspect="1"/>
+          </p:cNvPicPr>
+          <p:nvPr/>
+        </p:nvPicPr>
+        <p:blipFill>
+          <a:blip r:embed="rId2"/>
+          <a:stretch>
+            <a:fillRect/>
+          </a:stretch>
+        </p:blipFill>
+        <p:spPr>
+          <a:xfrm>
+            <a:off x="814806" y="1298742"/>
+            <a:ext cx="8102600" cy="5397500"/>
+          </a:xfrm>
+          <a:prstGeom prst="rect">
+            <a:avLst/>
+          </a:prstGeom>
+        </p:spPr>
+      </p:pic>
     </p:spTree>
     <p:extLst>
       <p:ext uri="{BB962C8B-B14F-4D97-AF65-F5344CB8AC3E}">
-        <p14:creationId xmlns:p14="http://schemas.microsoft.com/office/powerpoint/2010/main" val="547053293"/>
+        <p14:creationId xmlns:p14="http://schemas.microsoft.com/office/powerpoint/2010/main" val="2686587529"/>
       </p:ext>
     </p:extLst>
   </p:cSld>
@@ -6350,6 +6300,138 @@
             <p:ph type="title"/>
           </p:nvPr>
         </p:nvSpPr>
+        <p:spPr/>
+        <p:txBody>
+          <a:bodyPr/>
+          <a:lstStyle/>
+          <a:p>
+            <a:r>
+              <a:rPr lang="en-US" dirty="0" smtClean="0"/>
+              <a:t>Motivation and Audience</a:t>
+            </a:r>
+            <a:endParaRPr lang="en-US" dirty="0"/>
+          </a:p>
+        </p:txBody>
+      </p:sp>
+      <p:sp>
+        <p:nvSpPr>
+          <p:cNvPr id="3" name="Content Placeholder 2"/>
+          <p:cNvSpPr>
+            <a:spLocks noGrp="1"/>
+          </p:cNvSpPr>
+          <p:nvPr>
+            <p:ph idx="1"/>
+          </p:nvPr>
+        </p:nvSpPr>
+        <p:spPr/>
+        <p:txBody>
+          <a:bodyPr/>
+          <a:lstStyle/>
+          <a:p>
+            <a:r>
+              <a:rPr lang="en-US" dirty="0" smtClean="0"/>
+              <a:t>Learning how to effectively visualize simulation performance data on a smaller scale model</a:t>
+            </a:r>
+          </a:p>
+          <a:p>
+            <a:r>
+              <a:rPr lang="en-US" dirty="0" smtClean="0"/>
+              <a:t>PDES developers, particularly those using ROSS and other optimistic simulators</a:t>
+            </a:r>
+          </a:p>
+          <a:p>
+            <a:r>
+              <a:rPr lang="en-US" dirty="0" smtClean="0"/>
+              <a:t>Questions we aimed to answer with this visualization:</a:t>
+            </a:r>
+          </a:p>
+          <a:p>
+            <a:pPr lvl="1"/>
+            <a:r>
+              <a:rPr lang="en-US" dirty="0" smtClean="0"/>
+              <a:t>How can we boost the performance of the visualization?</a:t>
+            </a:r>
+          </a:p>
+          <a:p>
+            <a:pPr lvl="2"/>
+            <a:r>
+              <a:rPr lang="en-US" dirty="0" smtClean="0"/>
+              <a:t>Optimizing batch and </a:t>
+            </a:r>
+            <a:r>
+              <a:rPr lang="en-US" dirty="0" err="1" smtClean="0"/>
+              <a:t>gvt</a:t>
+            </a:r>
+            <a:r>
+              <a:rPr lang="en-US" dirty="0" smtClean="0"/>
+              <a:t>-interval parameters</a:t>
+            </a:r>
+          </a:p>
+          <a:p>
+            <a:pPr lvl="1"/>
+            <a:r>
+              <a:rPr lang="en-US" dirty="0" smtClean="0"/>
+              <a:t>How does the performance of the slim fly and dragonfly models differ?</a:t>
+            </a:r>
+          </a:p>
+          <a:p>
+            <a:pPr lvl="2"/>
+            <a:r>
+              <a:rPr lang="en-US" dirty="0" smtClean="0"/>
+              <a:t>Only had time to focus on the slim fly model</a:t>
+            </a:r>
+          </a:p>
+          <a:p>
+            <a:pPr marL="457200" lvl="1" indent="0">
+              <a:buNone/>
+            </a:pPr>
+            <a:endParaRPr lang="en-US" dirty="0" smtClean="0"/>
+          </a:p>
+          <a:p>
+            <a:endParaRPr lang="en-US" dirty="0"/>
+          </a:p>
+        </p:txBody>
+      </p:sp>
+    </p:spTree>
+    <p:extLst>
+      <p:ext uri="{BB962C8B-B14F-4D97-AF65-F5344CB8AC3E}">
+        <p14:creationId xmlns:p14="http://schemas.microsoft.com/office/powerpoint/2010/main" val="547053293"/>
+      </p:ext>
+    </p:extLst>
+  </p:cSld>
+  <p:clrMapOvr>
+    <a:masterClrMapping/>
+  </p:clrMapOvr>
+</p:sld>
+</file>
+
+<file path=ppt/slides/slide6.xml><?xml version="1.0" encoding="utf-8"?>
+<p:sld xmlns:a="http://schemas.openxmlformats.org/drawingml/2006/main" xmlns:r="http://schemas.openxmlformats.org/officeDocument/2006/relationships" xmlns:p="http://schemas.openxmlformats.org/presentationml/2006/main">
+  <p:cSld>
+    <p:spTree>
+      <p:nvGrpSpPr>
+        <p:cNvPr id="1" name=""/>
+        <p:cNvGrpSpPr/>
+        <p:nvPr/>
+      </p:nvGrpSpPr>
+      <p:grpSpPr>
+        <a:xfrm>
+          <a:off x="0" y="0"/>
+          <a:ext cx="0" cy="0"/>
+          <a:chOff x="0" y="0"/>
+          <a:chExt cx="0" cy="0"/>
+        </a:xfrm>
+      </p:grpSpPr>
+      <p:sp>
+        <p:nvSpPr>
+          <p:cNvPr id="2" name="Title 1"/>
+          <p:cNvSpPr>
+            <a:spLocks noGrp="1"/>
+          </p:cNvSpPr>
+          <p:nvPr>
+            <p:ph type="title"/>
+          </p:nvPr>
+        </p:nvSpPr>
         <p:spPr>
           <a:xfrm>
             <a:off x="4613087" y="2278519"/>
@@ -6383,7 +6465,7 @@
 </p:sld>
 </file>
 
-<file path=ppt/slides/slide6.xml><?xml version="1.0" encoding="utf-8"?>
+<file path=ppt/slides/slide7.xml><?xml version="1.0" encoding="utf-8"?>
 <p:sld xmlns:a="http://schemas.openxmlformats.org/drawingml/2006/main" xmlns:r="http://schemas.openxmlformats.org/officeDocument/2006/relationships" xmlns:p="http://schemas.openxmlformats.org/presentationml/2006/main">
   <p:cSld>
     <p:spTree>

</xml_diff>